<commit_message>
Add illustration for http striming using spring mvc
</commit_message>
<xml_diff>
--- a/spring-mvc-async.pptx
+++ b/spring-mvc-async.pptx
@@ -5,13 +5,14 @@
     <p:sldMasterId id="2147483648" r:id="rId1"/>
   </p:sldMasterIdLst>
   <p:notesMasterIdLst>
-    <p:notesMasterId r:id="rId6"/>
+    <p:notesMasterId r:id="rId7"/>
   </p:notesMasterIdLst>
   <p:sldIdLst>
     <p:sldId id="271" r:id="rId2"/>
     <p:sldId id="272" r:id="rId3"/>
     <p:sldId id="274" r:id="rId4"/>
     <p:sldId id="273" r:id="rId5"/>
+    <p:sldId id="275" r:id="rId6"/>
   </p:sldIdLst>
   <p:sldSz cx="12192000" cy="6858000"/>
   <p:notesSz cx="6858000" cy="9144000"/>
@@ -119,6 +120,7 @@
             <p14:sldId id="272"/>
             <p14:sldId id="274"/>
             <p14:sldId id="273"/>
+            <p14:sldId id="275"/>
           </p14:sldIdLst>
         </p14:section>
       </p14:sectionLst>
@@ -220,7 +222,7 @@
           <a:p>
             <a:fld id="{9E504720-E6DD-564E-A9E4-6973BED6C95B}" type="datetimeFigureOut">
               <a:rPr kumimoji="1" lang="ja-JP" altLang="en-US" smtClean="0"/>
-              <a:t>2016/5/20</a:t>
+              <a:t>2016/5/23</a:t>
             </a:fld>
             <a:endParaRPr kumimoji="1" lang="ja-JP" altLang="en-US"/>
           </a:p>
@@ -856,6 +858,90 @@
 </p:notes>
 </file>
 
+<file path=ppt/notesSlides/notesSlide5.xml><?xml version="1.0" encoding="utf-8"?>
+<p:notes xmlns:a="http://schemas.openxmlformats.org/drawingml/2006/main" xmlns:r="http://schemas.openxmlformats.org/officeDocument/2006/relationships" xmlns:p="http://schemas.openxmlformats.org/presentationml/2006/main">
+  <p:cSld>
+    <p:spTree>
+      <p:nvGrpSpPr>
+        <p:cNvPr id="1" name=""/>
+        <p:cNvGrpSpPr/>
+        <p:nvPr/>
+      </p:nvGrpSpPr>
+      <p:grpSpPr>
+        <a:xfrm>
+          <a:off x="0" y="0"/>
+          <a:ext cx="0" cy="0"/>
+          <a:chOff x="0" y="0"/>
+          <a:chExt cx="0" cy="0"/>
+        </a:xfrm>
+      </p:grpSpPr>
+      <p:sp>
+        <p:nvSpPr>
+          <p:cNvPr id="2" name="スライド イメージ プレースホルダー 1"/>
+          <p:cNvSpPr>
+            <a:spLocks noGrp="1" noRot="1" noChangeAspect="1"/>
+          </p:cNvSpPr>
+          <p:nvPr>
+            <p:ph type="sldImg"/>
+          </p:nvPr>
+        </p:nvSpPr>
+        <p:spPr/>
+      </p:sp>
+      <p:sp>
+        <p:nvSpPr>
+          <p:cNvPr id="3" name="ノート プレースホルダー 2"/>
+          <p:cNvSpPr>
+            <a:spLocks noGrp="1"/>
+          </p:cNvSpPr>
+          <p:nvPr>
+            <p:ph type="body" idx="1"/>
+          </p:nvPr>
+        </p:nvSpPr>
+        <p:spPr/>
+        <p:txBody>
+          <a:bodyPr/>
+          <a:lstStyle/>
+          <a:p>
+            <a:endParaRPr kumimoji="1" lang="ja-JP" altLang="en-US"/>
+          </a:p>
+        </p:txBody>
+      </p:sp>
+      <p:sp>
+        <p:nvSpPr>
+          <p:cNvPr id="4" name="スライド番号プレースホルダー 3"/>
+          <p:cNvSpPr>
+            <a:spLocks noGrp="1"/>
+          </p:cNvSpPr>
+          <p:nvPr>
+            <p:ph type="sldNum" sz="quarter" idx="10"/>
+          </p:nvPr>
+        </p:nvSpPr>
+        <p:spPr/>
+        <p:txBody>
+          <a:bodyPr/>
+          <a:lstStyle/>
+          <a:p>
+            <a:fld id="{986D9B47-72A5-A34A-A697-B29796339AD8}" type="slidenum">
+              <a:rPr kumimoji="1" lang="ja-JP" altLang="en-US" smtClean="0"/>
+              <a:t>5</a:t>
+            </a:fld>
+            <a:endParaRPr kumimoji="1" lang="ja-JP" altLang="en-US"/>
+          </a:p>
+        </p:txBody>
+      </p:sp>
+    </p:spTree>
+    <p:extLst>
+      <p:ext uri="{BB962C8B-B14F-4D97-AF65-F5344CB8AC3E}">
+        <p14:creationId xmlns:p14="http://schemas.microsoft.com/office/powerpoint/2010/main" val="290868226"/>
+      </p:ext>
+    </p:extLst>
+  </p:cSld>
+  <p:clrMapOvr>
+    <a:masterClrMapping/>
+  </p:clrMapOvr>
+</p:notes>
+</file>
+
 <file path=ppt/slideLayouts/slideLayout1.xml><?xml version="1.0" encoding="utf-8"?>
 <p:sldLayout xmlns:a="http://schemas.openxmlformats.org/drawingml/2006/main" xmlns:r="http://schemas.openxmlformats.org/officeDocument/2006/relationships" xmlns:p="http://schemas.openxmlformats.org/presentationml/2006/main" type="title" preserve="1">
   <p:cSld name="タイトル スライド">
@@ -987,7 +1073,7 @@
           <a:p>
             <a:fld id="{2D836C50-4024-0240-9768-AF72A8EA574D}" type="datetimeFigureOut">
               <a:rPr kumimoji="1" lang="ja-JP" altLang="en-US" smtClean="0"/>
-              <a:t>2016/5/20</a:t>
+              <a:t>2016/5/23</a:t>
             </a:fld>
             <a:endParaRPr kumimoji="1" lang="ja-JP" altLang="en-US"/>
           </a:p>
@@ -1189,7 +1275,7 @@
           <a:p>
             <a:fld id="{2D836C50-4024-0240-9768-AF72A8EA574D}" type="datetimeFigureOut">
               <a:rPr kumimoji="1" lang="ja-JP" altLang="en-US" smtClean="0"/>
-              <a:t>2016/5/20</a:t>
+              <a:t>2016/5/23</a:t>
             </a:fld>
             <a:endParaRPr kumimoji="1" lang="ja-JP" altLang="en-US"/>
           </a:p>
@@ -1401,7 +1487,7 @@
           <a:p>
             <a:fld id="{2D836C50-4024-0240-9768-AF72A8EA574D}" type="datetimeFigureOut">
               <a:rPr kumimoji="1" lang="ja-JP" altLang="en-US" smtClean="0"/>
-              <a:t>2016/5/20</a:t>
+              <a:t>2016/5/23</a:t>
             </a:fld>
             <a:endParaRPr kumimoji="1" lang="ja-JP" altLang="en-US"/>
           </a:p>
@@ -1603,7 +1689,7 @@
           <a:p>
             <a:fld id="{2D836C50-4024-0240-9768-AF72A8EA574D}" type="datetimeFigureOut">
               <a:rPr kumimoji="1" lang="ja-JP" altLang="en-US" smtClean="0"/>
-              <a:t>2016/5/20</a:t>
+              <a:t>2016/5/23</a:t>
             </a:fld>
             <a:endParaRPr kumimoji="1" lang="ja-JP" altLang="en-US"/>
           </a:p>
@@ -1849,7 +1935,7 @@
           <a:p>
             <a:fld id="{2D836C50-4024-0240-9768-AF72A8EA574D}" type="datetimeFigureOut">
               <a:rPr kumimoji="1" lang="ja-JP" altLang="en-US" smtClean="0"/>
-              <a:t>2016/5/20</a:t>
+              <a:t>2016/5/23</a:t>
             </a:fld>
             <a:endParaRPr kumimoji="1" lang="ja-JP" altLang="en-US"/>
           </a:p>
@@ -2145,7 +2231,7 @@
           <a:p>
             <a:fld id="{2D836C50-4024-0240-9768-AF72A8EA574D}" type="datetimeFigureOut">
               <a:rPr kumimoji="1" lang="ja-JP" altLang="en-US" smtClean="0"/>
-              <a:t>2016/5/20</a:t>
+              <a:t>2016/5/23</a:t>
             </a:fld>
             <a:endParaRPr kumimoji="1" lang="ja-JP" altLang="en-US"/>
           </a:p>
@@ -2576,7 +2662,7 @@
           <a:p>
             <a:fld id="{2D836C50-4024-0240-9768-AF72A8EA574D}" type="datetimeFigureOut">
               <a:rPr kumimoji="1" lang="ja-JP" altLang="en-US" smtClean="0"/>
-              <a:t>2016/5/20</a:t>
+              <a:t>2016/5/23</a:t>
             </a:fld>
             <a:endParaRPr kumimoji="1" lang="ja-JP" altLang="en-US"/>
           </a:p>
@@ -2694,7 +2780,7 @@
           <a:p>
             <a:fld id="{2D836C50-4024-0240-9768-AF72A8EA574D}" type="datetimeFigureOut">
               <a:rPr kumimoji="1" lang="ja-JP" altLang="en-US" smtClean="0"/>
-              <a:t>2016/5/20</a:t>
+              <a:t>2016/5/23</a:t>
             </a:fld>
             <a:endParaRPr kumimoji="1" lang="ja-JP" altLang="en-US"/>
           </a:p>
@@ -2789,7 +2875,7 @@
           <a:p>
             <a:fld id="{2D836C50-4024-0240-9768-AF72A8EA574D}" type="datetimeFigureOut">
               <a:rPr kumimoji="1" lang="ja-JP" altLang="en-US" smtClean="0"/>
-              <a:t>2016/5/20</a:t>
+              <a:t>2016/5/23</a:t>
             </a:fld>
             <a:endParaRPr kumimoji="1" lang="ja-JP" altLang="en-US"/>
           </a:p>
@@ -3098,7 +3184,7 @@
           <a:p>
             <a:fld id="{2D836C50-4024-0240-9768-AF72A8EA574D}" type="datetimeFigureOut">
               <a:rPr kumimoji="1" lang="ja-JP" altLang="en-US" smtClean="0"/>
-              <a:t>2016/5/20</a:t>
+              <a:t>2016/5/23</a:t>
             </a:fld>
             <a:endParaRPr kumimoji="1" lang="ja-JP" altLang="en-US"/>
           </a:p>
@@ -3351,7 +3437,7 @@
           <a:p>
             <a:fld id="{2D836C50-4024-0240-9768-AF72A8EA574D}" type="datetimeFigureOut">
               <a:rPr kumimoji="1" lang="ja-JP" altLang="en-US" smtClean="0"/>
-              <a:t>2016/5/20</a:t>
+              <a:t>2016/5/23</a:t>
             </a:fld>
             <a:endParaRPr kumimoji="1" lang="ja-JP" altLang="en-US"/>
           </a:p>
@@ -3596,7 +3682,7 @@
           <a:p>
             <a:fld id="{2D836C50-4024-0240-9768-AF72A8EA574D}" type="datetimeFigureOut">
               <a:rPr kumimoji="1" lang="ja-JP" altLang="en-US" smtClean="0"/>
-              <a:t>2016/5/20</a:t>
+              <a:t>2016/5/23</a:t>
             </a:fld>
             <a:endParaRPr kumimoji="1" lang="ja-JP" altLang="en-US"/>
           </a:p>
@@ -5073,11 +5159,7 @@
             <a:pPr algn="ctr"/>
             <a:r>
               <a:rPr lang="en-US" altLang="ja-JP" dirty="0" err="1" smtClean="0"/>
-              <a:t>Dispatcher</a:t>
-            </a:r>
-            <a:r>
-              <a:rPr lang="en-US" altLang="ja-JP" dirty="0" err="1" smtClean="0"/>
-              <a:t>Servlet</a:t>
+              <a:t>DispatcherServlet</a:t>
             </a:r>
             <a:endParaRPr lang="en-US" altLang="ja-JP" dirty="0" smtClean="0"/>
           </a:p>
@@ -8186,11 +8268,7 @@
             <a:pPr algn="ctr"/>
             <a:r>
               <a:rPr lang="en-US" altLang="ja-JP" dirty="0" err="1" smtClean="0"/>
-              <a:t>Dispatcher</a:t>
-            </a:r>
-            <a:r>
-              <a:rPr lang="en-US" altLang="ja-JP" dirty="0" err="1" smtClean="0"/>
-              <a:t>Servlet</a:t>
+              <a:t>DispatcherServlet</a:t>
             </a:r>
             <a:endParaRPr lang="en-US" altLang="ja-JP" dirty="0" smtClean="0"/>
           </a:p>
@@ -10693,13 +10771,8 @@
             <a:pPr algn="ctr"/>
             <a:r>
               <a:rPr lang="en-US" altLang="ja-JP" sz="1200" b="1" dirty="0" smtClean="0"/>
-              <a:t>&lt;interface</a:t>
-            </a:r>
-            <a:r>
-              <a:rPr lang="en-US" altLang="ja-JP" sz="1200" b="1" dirty="0" smtClean="0"/>
-              <a:t>&gt;</a:t>
-            </a:r>
-            <a:endParaRPr lang="en-US" altLang="ja-JP" sz="1200" b="1" dirty="0" smtClean="0"/>
+              <a:t>&lt;interface&gt;</a:t>
+            </a:r>
           </a:p>
           <a:p>
             <a:pPr algn="ctr"/>
@@ -11907,6 +11980,2078 @@
     <p:extLst>
       <p:ext uri="{BB962C8B-B14F-4D97-AF65-F5344CB8AC3E}">
         <p14:creationId xmlns:p14="http://schemas.microsoft.com/office/powerpoint/2010/main" val="1621849181"/>
+      </p:ext>
+    </p:extLst>
+  </p:cSld>
+  <p:clrMapOvr>
+    <a:masterClrMapping/>
+  </p:clrMapOvr>
+  <p:timing>
+    <p:tnLst>
+      <p:par>
+        <p:cTn id="1" dur="indefinite" restart="never" nodeType="tmRoot"/>
+      </p:par>
+    </p:tnLst>
+  </p:timing>
+</p:sld>
+</file>
+
+<file path=ppt/slides/slide5.xml><?xml version="1.0" encoding="utf-8"?>
+<p:sld xmlns:a="http://schemas.openxmlformats.org/drawingml/2006/main" xmlns:r="http://schemas.openxmlformats.org/officeDocument/2006/relationships" xmlns:p="http://schemas.openxmlformats.org/presentationml/2006/main">
+  <p:cSld>
+    <p:spTree>
+      <p:nvGrpSpPr>
+        <p:cNvPr id="1" name=""/>
+        <p:cNvGrpSpPr/>
+        <p:nvPr/>
+      </p:nvGrpSpPr>
+      <p:grpSpPr>
+        <a:xfrm>
+          <a:off x="0" y="0"/>
+          <a:ext cx="0" cy="0"/>
+          <a:chOff x="0" y="0"/>
+          <a:chExt cx="0" cy="0"/>
+        </a:xfrm>
+      </p:grpSpPr>
+      <p:sp>
+        <p:nvSpPr>
+          <p:cNvPr id="10" name="角丸四角形 9"/>
+          <p:cNvSpPr/>
+          <p:nvPr/>
+        </p:nvSpPr>
+        <p:spPr>
+          <a:xfrm>
+            <a:off x="777706" y="3323218"/>
+            <a:ext cx="1569309" cy="913758"/>
+          </a:xfrm>
+          <a:prstGeom prst="roundRect">
+            <a:avLst/>
+          </a:prstGeom>
+          <a:solidFill>
+            <a:schemeClr val="bg1">
+              <a:lumMod val="85000"/>
+            </a:schemeClr>
+          </a:solidFill>
+          <a:ln w="76200">
+            <a:solidFill>
+              <a:schemeClr val="tx1">
+                <a:lumMod val="50000"/>
+                <a:lumOff val="50000"/>
+              </a:schemeClr>
+            </a:solidFill>
+          </a:ln>
+        </p:spPr>
+        <p:style>
+          <a:lnRef idx="2">
+            <a:schemeClr val="dk1"/>
+          </a:lnRef>
+          <a:fillRef idx="1">
+            <a:schemeClr val="lt1"/>
+          </a:fillRef>
+          <a:effectRef idx="0">
+            <a:schemeClr val="dk1"/>
+          </a:effectRef>
+          <a:fontRef idx="minor">
+            <a:schemeClr val="dk1"/>
+          </a:fontRef>
+        </p:style>
+        <p:txBody>
+          <a:bodyPr rtlCol="0" anchor="ctr"/>
+          <a:lstStyle/>
+          <a:p>
+            <a:pPr algn="ctr"/>
+            <a:endParaRPr kumimoji="1" lang="ja-JP" altLang="en-US"/>
+          </a:p>
+        </p:txBody>
+      </p:sp>
+      <p:sp>
+        <p:nvSpPr>
+          <p:cNvPr id="14" name="フローチャート: 磁気ディスク 13"/>
+          <p:cNvSpPr/>
+          <p:nvPr/>
+        </p:nvSpPr>
+        <p:spPr>
+          <a:xfrm>
+            <a:off x="1114331" y="4483122"/>
+            <a:ext cx="914400" cy="173737"/>
+          </a:xfrm>
+          <a:prstGeom prst="flowChartMagneticDisk">
+            <a:avLst/>
+          </a:prstGeom>
+          <a:solidFill>
+            <a:schemeClr val="bg1">
+              <a:lumMod val="50000"/>
+            </a:schemeClr>
+          </a:solidFill>
+          <a:ln>
+            <a:solidFill>
+              <a:schemeClr val="tx1">
+                <a:lumMod val="65000"/>
+                <a:lumOff val="35000"/>
+              </a:schemeClr>
+            </a:solidFill>
+          </a:ln>
+        </p:spPr>
+        <p:style>
+          <a:lnRef idx="2">
+            <a:schemeClr val="accent3">
+              <a:shade val="50000"/>
+            </a:schemeClr>
+          </a:lnRef>
+          <a:fillRef idx="1">
+            <a:schemeClr val="accent3"/>
+          </a:fillRef>
+          <a:effectRef idx="0">
+            <a:schemeClr val="accent3"/>
+          </a:effectRef>
+          <a:fontRef idx="minor">
+            <a:schemeClr val="lt1"/>
+          </a:fontRef>
+        </p:style>
+        <p:txBody>
+          <a:bodyPr rtlCol="0" anchor="ctr"/>
+          <a:lstStyle/>
+          <a:p>
+            <a:pPr algn="ctr"/>
+            <a:endParaRPr kumimoji="1" lang="ja-JP" altLang="en-US"/>
+          </a:p>
+        </p:txBody>
+      </p:sp>
+      <p:sp>
+        <p:nvSpPr>
+          <p:cNvPr id="31" name="角丸四角形 30"/>
+          <p:cNvSpPr/>
+          <p:nvPr/>
+        </p:nvSpPr>
+        <p:spPr>
+          <a:xfrm rot="5400000">
+            <a:off x="1440436" y="4350176"/>
+            <a:ext cx="269604" cy="45719"/>
+          </a:xfrm>
+          <a:prstGeom prst="roundRect">
+            <a:avLst/>
+          </a:prstGeom>
+          <a:solidFill>
+            <a:schemeClr val="bg1">
+              <a:lumMod val="85000"/>
+            </a:schemeClr>
+          </a:solidFill>
+          <a:ln w="76200">
+            <a:solidFill>
+              <a:schemeClr val="tx1">
+                <a:lumMod val="50000"/>
+                <a:lumOff val="50000"/>
+              </a:schemeClr>
+            </a:solidFill>
+          </a:ln>
+        </p:spPr>
+        <p:style>
+          <a:lnRef idx="2">
+            <a:schemeClr val="dk1"/>
+          </a:lnRef>
+          <a:fillRef idx="1">
+            <a:schemeClr val="lt1"/>
+          </a:fillRef>
+          <a:effectRef idx="0">
+            <a:schemeClr val="dk1"/>
+          </a:effectRef>
+          <a:fontRef idx="minor">
+            <a:schemeClr val="dk1"/>
+          </a:fontRef>
+        </p:style>
+        <p:txBody>
+          <a:bodyPr rtlCol="0" anchor="ctr"/>
+          <a:lstStyle/>
+          <a:p>
+            <a:pPr algn="ctr"/>
+            <a:endParaRPr kumimoji="1" lang="ja-JP" altLang="en-US"/>
+          </a:p>
+        </p:txBody>
+      </p:sp>
+      <p:sp>
+        <p:nvSpPr>
+          <p:cNvPr id="15" name="テキスト ボックス 14"/>
+          <p:cNvSpPr txBox="1"/>
+          <p:nvPr/>
+        </p:nvSpPr>
+        <p:spPr>
+          <a:xfrm>
+            <a:off x="1062534" y="2780307"/>
+            <a:ext cx="1071127" cy="461665"/>
+          </a:xfrm>
+          <a:prstGeom prst="rect">
+            <a:avLst/>
+          </a:prstGeom>
+          <a:noFill/>
+        </p:spPr>
+        <p:txBody>
+          <a:bodyPr wrap="none" rtlCol="0">
+            <a:spAutoFit/>
+          </a:bodyPr>
+          <a:lstStyle/>
+          <a:p>
+            <a:r>
+              <a:rPr kumimoji="1" lang="en-US" altLang="ja-JP" sz="2400" b="1" dirty="0" smtClean="0">
+                <a:solidFill>
+                  <a:schemeClr val="tx1">
+                    <a:lumMod val="50000"/>
+                    <a:lumOff val="50000"/>
+                  </a:schemeClr>
+                </a:solidFill>
+              </a:rPr>
+              <a:t>Client</a:t>
+            </a:r>
+            <a:endParaRPr kumimoji="1" lang="ja-JP" altLang="en-US" sz="2400" b="1" dirty="0">
+              <a:solidFill>
+                <a:schemeClr val="tx1">
+                  <a:lumMod val="50000"/>
+                  <a:lumOff val="50000"/>
+                </a:schemeClr>
+              </a:solidFill>
+            </a:endParaRPr>
+          </a:p>
+        </p:txBody>
+      </p:sp>
+      <p:sp>
+        <p:nvSpPr>
+          <p:cNvPr id="50" name="正方形/長方形 49"/>
+          <p:cNvSpPr/>
+          <p:nvPr/>
+        </p:nvSpPr>
+        <p:spPr>
+          <a:xfrm>
+            <a:off x="8121286" y="1362692"/>
+            <a:ext cx="1764492" cy="903981"/>
+          </a:xfrm>
+          <a:prstGeom prst="rect">
+            <a:avLst/>
+          </a:prstGeom>
+          <a:solidFill>
+            <a:schemeClr val="accent1">
+              <a:lumMod val="60000"/>
+              <a:lumOff val="40000"/>
+            </a:schemeClr>
+          </a:solidFill>
+          <a:ln>
+            <a:noFill/>
+          </a:ln>
+        </p:spPr>
+        <p:style>
+          <a:lnRef idx="2">
+            <a:schemeClr val="accent1">
+              <a:shade val="50000"/>
+            </a:schemeClr>
+          </a:lnRef>
+          <a:fillRef idx="1">
+            <a:schemeClr val="accent1"/>
+          </a:fillRef>
+          <a:effectRef idx="0">
+            <a:schemeClr val="accent1"/>
+          </a:effectRef>
+          <a:fontRef idx="minor">
+            <a:schemeClr val="lt1"/>
+          </a:fontRef>
+        </p:style>
+        <p:txBody>
+          <a:bodyPr rtlCol="0" anchor="ctr" anchorCtr="0"/>
+          <a:lstStyle/>
+          <a:p>
+            <a:pPr algn="ctr"/>
+            <a:r>
+              <a:rPr lang="en-US" altLang="ja-JP" sz="2000" dirty="0" smtClean="0">
+                <a:solidFill>
+                  <a:schemeClr val="bg1"/>
+                </a:solidFill>
+                <a:latin typeface="HGP創英角ｺﾞｼｯｸUB" panose="020B0900000000000000" pitchFamily="50" charset="-128"/>
+                <a:ea typeface="HGP創英角ｺﾞｼｯｸUB" panose="020B0900000000000000" pitchFamily="50" charset="-128"/>
+              </a:rPr>
+              <a:t>Streaming</a:t>
+            </a:r>
+            <a:endParaRPr lang="en-US" altLang="ja-JP" sz="2000" dirty="0" smtClean="0">
+              <a:solidFill>
+                <a:schemeClr val="bg1"/>
+              </a:solidFill>
+              <a:latin typeface="HGP創英角ｺﾞｼｯｸUB" panose="020B0900000000000000" pitchFamily="50" charset="-128"/>
+              <a:ea typeface="HGP創英角ｺﾞｼｯｸUB" panose="020B0900000000000000" pitchFamily="50" charset="-128"/>
+            </a:endParaRPr>
+          </a:p>
+          <a:p>
+            <a:pPr algn="ctr"/>
+            <a:r>
+              <a:rPr lang="en-US" altLang="ja-JP" sz="2000" dirty="0" smtClean="0">
+                <a:solidFill>
+                  <a:schemeClr val="bg1"/>
+                </a:solidFill>
+                <a:latin typeface="HGP創英角ｺﾞｼｯｸUB" panose="020B0900000000000000" pitchFamily="50" charset="-128"/>
+                <a:ea typeface="HGP創英角ｺﾞｼｯｸUB" panose="020B0900000000000000" pitchFamily="50" charset="-128"/>
+              </a:rPr>
+              <a:t>Controller</a:t>
+            </a:r>
+            <a:endParaRPr lang="en-US" altLang="ja-JP" sz="2000" dirty="0">
+              <a:solidFill>
+                <a:schemeClr val="bg1"/>
+              </a:solidFill>
+              <a:latin typeface="HGP創英角ｺﾞｼｯｸUB" panose="020B0900000000000000" pitchFamily="50" charset="-128"/>
+              <a:ea typeface="HGP創英角ｺﾞｼｯｸUB" panose="020B0900000000000000" pitchFamily="50" charset="-128"/>
+            </a:endParaRPr>
+          </a:p>
+        </p:txBody>
+      </p:sp>
+      <p:sp>
+        <p:nvSpPr>
+          <p:cNvPr id="52" name="正方形/長方形 51"/>
+          <p:cNvSpPr/>
+          <p:nvPr/>
+        </p:nvSpPr>
+        <p:spPr>
+          <a:xfrm>
+            <a:off x="3802463" y="851309"/>
+            <a:ext cx="7697692" cy="2116513"/>
+          </a:xfrm>
+          <a:prstGeom prst="rect">
+            <a:avLst/>
+          </a:prstGeom>
+          <a:noFill/>
+          <a:ln>
+            <a:solidFill>
+              <a:srgbClr val="D99897"/>
+            </a:solidFill>
+            <a:prstDash val="sysDash"/>
+          </a:ln>
+        </p:spPr>
+        <p:style>
+          <a:lnRef idx="2">
+            <a:schemeClr val="accent1">
+              <a:shade val="50000"/>
+            </a:schemeClr>
+          </a:lnRef>
+          <a:fillRef idx="1">
+            <a:schemeClr val="accent1"/>
+          </a:fillRef>
+          <a:effectRef idx="0">
+            <a:schemeClr val="accent1"/>
+          </a:effectRef>
+          <a:fontRef idx="minor">
+            <a:schemeClr val="lt1"/>
+          </a:fontRef>
+        </p:style>
+        <p:txBody>
+          <a:bodyPr rtlCol="0" anchor="t" anchorCtr="0"/>
+          <a:lstStyle/>
+          <a:p>
+            <a:pPr algn="r"/>
+            <a:r>
+              <a:rPr lang="ja-JP" altLang="en-US" sz="1400" dirty="0" smtClean="0">
+                <a:solidFill>
+                  <a:schemeClr val="tx1"/>
+                </a:solidFill>
+                <a:latin typeface="HGP創英角ｺﾞｼｯｸUB" panose="020B0900000000000000" pitchFamily="50" charset="-128"/>
+                <a:ea typeface="HGP創英角ｺﾞｼｯｸUB" panose="020B0900000000000000" pitchFamily="50" charset="-128"/>
+              </a:rPr>
+              <a:t>アプリケーションサーバー管理のスレッド</a:t>
+            </a:r>
+            <a:endParaRPr lang="en-US" altLang="ja-JP" sz="1400" dirty="0">
+              <a:solidFill>
+                <a:schemeClr val="tx1"/>
+              </a:solidFill>
+              <a:latin typeface="HGP創英角ｺﾞｼｯｸUB" panose="020B0900000000000000" pitchFamily="50" charset="-128"/>
+              <a:ea typeface="HGP創英角ｺﾞｼｯｸUB" panose="020B0900000000000000" pitchFamily="50" charset="-128"/>
+            </a:endParaRPr>
+          </a:p>
+        </p:txBody>
+      </p:sp>
+      <p:sp>
+        <p:nvSpPr>
+          <p:cNvPr id="53" name="正方形/長方形 52"/>
+          <p:cNvSpPr/>
+          <p:nvPr/>
+        </p:nvSpPr>
+        <p:spPr>
+          <a:xfrm>
+            <a:off x="3821451" y="3083001"/>
+            <a:ext cx="7657438" cy="1918830"/>
+          </a:xfrm>
+          <a:prstGeom prst="rect">
+            <a:avLst/>
+          </a:prstGeom>
+          <a:noFill/>
+          <a:ln>
+            <a:solidFill>
+              <a:schemeClr val="accent1">
+                <a:lumMod val="60000"/>
+                <a:lumOff val="40000"/>
+              </a:schemeClr>
+            </a:solidFill>
+            <a:prstDash val="sysDash"/>
+          </a:ln>
+        </p:spPr>
+        <p:style>
+          <a:lnRef idx="2">
+            <a:schemeClr val="accent1">
+              <a:shade val="50000"/>
+            </a:schemeClr>
+          </a:lnRef>
+          <a:fillRef idx="1">
+            <a:schemeClr val="accent1"/>
+          </a:fillRef>
+          <a:effectRef idx="0">
+            <a:schemeClr val="accent1"/>
+          </a:effectRef>
+          <a:fontRef idx="minor">
+            <a:schemeClr val="lt1"/>
+          </a:fontRef>
+        </p:style>
+        <p:txBody>
+          <a:bodyPr rtlCol="0" anchor="t" anchorCtr="0"/>
+          <a:lstStyle/>
+          <a:p>
+            <a:pPr algn="r"/>
+            <a:r>
+              <a:rPr lang="ja-JP" altLang="en-US" sz="1400" dirty="0" smtClean="0">
+                <a:solidFill>
+                  <a:schemeClr val="tx1"/>
+                </a:solidFill>
+                <a:latin typeface="HGP創英角ｺﾞｼｯｸUB" panose="020B0900000000000000" pitchFamily="50" charset="-128"/>
+                <a:ea typeface="HGP創英角ｺﾞｼｯｸUB" panose="020B0900000000000000" pitchFamily="50" charset="-128"/>
+              </a:rPr>
+              <a:t>アプリ</a:t>
+            </a:r>
+            <a:r>
+              <a:rPr lang="ja-JP" altLang="en-US" sz="1400" dirty="0" smtClean="0">
+                <a:solidFill>
+                  <a:schemeClr val="tx1"/>
+                </a:solidFill>
+                <a:latin typeface="HGP創英角ｺﾞｼｯｸUB" panose="020B0900000000000000" pitchFamily="50" charset="-128"/>
+                <a:ea typeface="HGP創英角ｺﾞｼｯｸUB" panose="020B0900000000000000" pitchFamily="50" charset="-128"/>
+              </a:rPr>
+              <a:t>管理</a:t>
+            </a:r>
+            <a:endParaRPr lang="en-US" altLang="ja-JP" sz="1400" dirty="0" smtClean="0">
+              <a:solidFill>
+                <a:schemeClr val="tx1"/>
+              </a:solidFill>
+              <a:latin typeface="HGP創英角ｺﾞｼｯｸUB" panose="020B0900000000000000" pitchFamily="50" charset="-128"/>
+              <a:ea typeface="HGP創英角ｺﾞｼｯｸUB" panose="020B0900000000000000" pitchFamily="50" charset="-128"/>
+            </a:endParaRPr>
+          </a:p>
+          <a:p>
+            <a:pPr algn="r"/>
+            <a:r>
+              <a:rPr lang="ja-JP" altLang="en-US" sz="1400" dirty="0" smtClean="0">
+                <a:solidFill>
+                  <a:schemeClr val="tx1"/>
+                </a:solidFill>
+                <a:latin typeface="HGP創英角ｺﾞｼｯｸUB" panose="020B0900000000000000" pitchFamily="50" charset="-128"/>
+                <a:ea typeface="HGP創英角ｺﾞｼｯｸUB" panose="020B0900000000000000" pitchFamily="50" charset="-128"/>
+              </a:rPr>
+              <a:t>の</a:t>
+            </a:r>
+            <a:r>
+              <a:rPr lang="ja-JP" altLang="en-US" sz="1400" dirty="0" smtClean="0">
+                <a:solidFill>
+                  <a:schemeClr val="tx1"/>
+                </a:solidFill>
+                <a:latin typeface="HGP創英角ｺﾞｼｯｸUB" panose="020B0900000000000000" pitchFamily="50" charset="-128"/>
+                <a:ea typeface="HGP創英角ｺﾞｼｯｸUB" panose="020B0900000000000000" pitchFamily="50" charset="-128"/>
+              </a:rPr>
+              <a:t>スレッド</a:t>
+            </a:r>
+            <a:endParaRPr lang="en-US" altLang="ja-JP" sz="1400" dirty="0">
+              <a:solidFill>
+                <a:schemeClr val="tx1"/>
+              </a:solidFill>
+              <a:latin typeface="HGP創英角ｺﾞｼｯｸUB" panose="020B0900000000000000" pitchFamily="50" charset="-128"/>
+              <a:ea typeface="HGP創英角ｺﾞｼｯｸUB" panose="020B0900000000000000" pitchFamily="50" charset="-128"/>
+            </a:endParaRPr>
+          </a:p>
+        </p:txBody>
+      </p:sp>
+      <p:sp>
+        <p:nvSpPr>
+          <p:cNvPr id="54" name="正方形/長方形 53"/>
+          <p:cNvSpPr/>
+          <p:nvPr/>
+        </p:nvSpPr>
+        <p:spPr>
+          <a:xfrm>
+            <a:off x="8230050" y="3256234"/>
+            <a:ext cx="1729245" cy="1398710"/>
+          </a:xfrm>
+          <a:prstGeom prst="rect">
+            <a:avLst/>
+          </a:prstGeom>
+          <a:solidFill>
+            <a:schemeClr val="accent1">
+              <a:lumMod val="20000"/>
+              <a:lumOff val="80000"/>
+            </a:schemeClr>
+          </a:solidFill>
+          <a:ln>
+            <a:solidFill>
+              <a:schemeClr val="accent1">
+                <a:lumMod val="20000"/>
+                <a:lumOff val="80000"/>
+              </a:schemeClr>
+            </a:solidFill>
+          </a:ln>
+        </p:spPr>
+        <p:style>
+          <a:lnRef idx="2">
+            <a:schemeClr val="accent1">
+              <a:shade val="50000"/>
+            </a:schemeClr>
+          </a:lnRef>
+          <a:fillRef idx="1">
+            <a:schemeClr val="accent1"/>
+          </a:fillRef>
+          <a:effectRef idx="0">
+            <a:schemeClr val="accent1"/>
+          </a:effectRef>
+          <a:fontRef idx="minor">
+            <a:schemeClr val="lt1"/>
+          </a:fontRef>
+        </p:style>
+        <p:txBody>
+          <a:bodyPr rtlCol="0" anchor="ctr" anchorCtr="0"/>
+          <a:lstStyle/>
+          <a:p>
+            <a:pPr algn="ctr"/>
+            <a:r>
+              <a:rPr lang="ja-JP" altLang="en-US" dirty="0" smtClean="0">
+                <a:solidFill>
+                  <a:schemeClr val="tx1"/>
+                </a:solidFill>
+                <a:latin typeface="HGP創英角ｺﾞｼｯｸUB" panose="020B0900000000000000" pitchFamily="50" charset="-128"/>
+                <a:ea typeface="HGP創英角ｺﾞｼｯｸUB" panose="020B0900000000000000" pitchFamily="50" charset="-128"/>
+              </a:rPr>
+              <a:t>非同期処理</a:t>
+            </a:r>
+            <a:endParaRPr lang="en-US" altLang="ja-JP" dirty="0">
+              <a:solidFill>
+                <a:schemeClr val="tx1"/>
+              </a:solidFill>
+              <a:latin typeface="HGP創英角ｺﾞｼｯｸUB" panose="020B0900000000000000" pitchFamily="50" charset="-128"/>
+              <a:ea typeface="HGP創英角ｺﾞｼｯｸUB" panose="020B0900000000000000" pitchFamily="50" charset="-128"/>
+            </a:endParaRPr>
+          </a:p>
+        </p:txBody>
+      </p:sp>
+      <p:cxnSp>
+        <p:nvCxnSpPr>
+          <p:cNvPr id="55" name="直線矢印コネクタ 49"/>
+          <p:cNvCxnSpPr/>
+          <p:nvPr/>
+        </p:nvCxnSpPr>
+        <p:spPr bwMode="invGray">
+          <a:xfrm flipH="1">
+            <a:off x="6336433" y="2038168"/>
+            <a:ext cx="1703801" cy="0"/>
+          </a:xfrm>
+          <a:prstGeom prst="straightConnector1">
+            <a:avLst/>
+          </a:prstGeom>
+          <a:ln w="28575">
+            <a:solidFill>
+              <a:schemeClr val="tx2">
+                <a:lumMod val="40000"/>
+                <a:lumOff val="60000"/>
+              </a:schemeClr>
+            </a:solidFill>
+            <a:prstDash val="dash"/>
+            <a:headEnd type="none" w="lg" len="lg"/>
+            <a:tailEnd type="triangle" w="lg" len="lg"/>
+          </a:ln>
+        </p:spPr>
+        <p:style>
+          <a:lnRef idx="1">
+            <a:schemeClr val="accent1"/>
+          </a:lnRef>
+          <a:fillRef idx="0">
+            <a:schemeClr val="accent1"/>
+          </a:fillRef>
+          <a:effectRef idx="0">
+            <a:schemeClr val="accent1"/>
+          </a:effectRef>
+          <a:fontRef idx="minor">
+            <a:schemeClr val="tx1"/>
+          </a:fontRef>
+        </p:style>
+      </p:cxnSp>
+      <p:sp>
+        <p:nvSpPr>
+          <p:cNvPr id="56" name="正方形/長方形 55"/>
+          <p:cNvSpPr/>
+          <p:nvPr/>
+        </p:nvSpPr>
+        <p:spPr>
+          <a:xfrm>
+            <a:off x="3838346" y="5125734"/>
+            <a:ext cx="7651176" cy="1263993"/>
+          </a:xfrm>
+          <a:prstGeom prst="rect">
+            <a:avLst/>
+          </a:prstGeom>
+          <a:noFill/>
+          <a:ln>
+            <a:solidFill>
+              <a:srgbClr val="D99897"/>
+            </a:solidFill>
+            <a:prstDash val="sysDash"/>
+          </a:ln>
+        </p:spPr>
+        <p:style>
+          <a:lnRef idx="2">
+            <a:schemeClr val="accent1">
+              <a:shade val="50000"/>
+            </a:schemeClr>
+          </a:lnRef>
+          <a:fillRef idx="1">
+            <a:schemeClr val="accent1"/>
+          </a:fillRef>
+          <a:effectRef idx="0">
+            <a:schemeClr val="accent1"/>
+          </a:effectRef>
+          <a:fontRef idx="minor">
+            <a:schemeClr val="lt1"/>
+          </a:fontRef>
+        </p:style>
+        <p:txBody>
+          <a:bodyPr rtlCol="0" anchor="t" anchorCtr="0"/>
+          <a:lstStyle/>
+          <a:p>
+            <a:pPr algn="r"/>
+            <a:r>
+              <a:rPr lang="ja-JP" altLang="en-US" sz="1400" dirty="0">
+                <a:solidFill>
+                  <a:schemeClr val="tx1"/>
+                </a:solidFill>
+                <a:latin typeface="HGP創英角ｺﾞｼｯｸUB" panose="020B0900000000000000" pitchFamily="50" charset="-128"/>
+                <a:ea typeface="HGP創英角ｺﾞｼｯｸUB" panose="020B0900000000000000" pitchFamily="50" charset="-128"/>
+              </a:rPr>
+              <a:t>アプリケーションサーバー管理のスレッド</a:t>
+            </a:r>
+            <a:endParaRPr lang="en-US" altLang="ja-JP" sz="1400" dirty="0">
+              <a:solidFill>
+                <a:schemeClr val="tx1"/>
+              </a:solidFill>
+              <a:latin typeface="HGP創英角ｺﾞｼｯｸUB" panose="020B0900000000000000" pitchFamily="50" charset="-128"/>
+              <a:ea typeface="HGP創英角ｺﾞｼｯｸUB" panose="020B0900000000000000" pitchFamily="50" charset="-128"/>
+            </a:endParaRPr>
+          </a:p>
+        </p:txBody>
+      </p:sp>
+      <p:cxnSp>
+        <p:nvCxnSpPr>
+          <p:cNvPr id="59" name="直線矢印コネクタ 58"/>
+          <p:cNvCxnSpPr>
+            <a:stCxn id="15" idx="0"/>
+          </p:cNvCxnSpPr>
+          <p:nvPr/>
+        </p:nvCxnSpPr>
+        <p:spPr bwMode="invGray">
+          <a:xfrm rot="5400000" flipH="1" flipV="1">
+            <a:off x="1368348" y="1361317"/>
+            <a:ext cx="1648740" cy="1189240"/>
+          </a:xfrm>
+          <a:prstGeom prst="bentConnector3">
+            <a:avLst>
+              <a:gd name="adj1" fmla="val 100261"/>
+            </a:avLst>
+          </a:prstGeom>
+          <a:ln w="50800">
+            <a:solidFill>
+              <a:schemeClr val="tx1">
+                <a:lumMod val="50000"/>
+                <a:lumOff val="50000"/>
+              </a:schemeClr>
+            </a:solidFill>
+            <a:headEnd type="none" w="med" len="med"/>
+            <a:tailEnd type="triangle" w="med" len="med"/>
+          </a:ln>
+        </p:spPr>
+        <p:style>
+          <a:lnRef idx="1">
+            <a:schemeClr val="accent1"/>
+          </a:lnRef>
+          <a:fillRef idx="0">
+            <a:schemeClr val="accent1"/>
+          </a:fillRef>
+          <a:effectRef idx="0">
+            <a:schemeClr val="accent1"/>
+          </a:effectRef>
+          <a:fontRef idx="minor">
+            <a:schemeClr val="tx1"/>
+          </a:fontRef>
+        </p:style>
+      </p:cxnSp>
+      <p:cxnSp>
+        <p:nvCxnSpPr>
+          <p:cNvPr id="64" name="直線矢印コネクタ 63"/>
+          <p:cNvCxnSpPr>
+            <a:endCxn id="14" idx="3"/>
+          </p:cNvCxnSpPr>
+          <p:nvPr/>
+        </p:nvCxnSpPr>
+        <p:spPr bwMode="invGray">
+          <a:xfrm rot="16200000" flipV="1">
+            <a:off x="1456318" y="4772073"/>
+            <a:ext cx="1446235" cy="1215807"/>
+          </a:xfrm>
+          <a:prstGeom prst="bentConnector3">
+            <a:avLst>
+              <a:gd name="adj1" fmla="val 1478"/>
+            </a:avLst>
+          </a:prstGeom>
+          <a:ln w="50800">
+            <a:solidFill>
+              <a:schemeClr val="tx1">
+                <a:lumMod val="50000"/>
+                <a:lumOff val="50000"/>
+              </a:schemeClr>
+            </a:solidFill>
+            <a:headEnd type="none" w="med" len="med"/>
+            <a:tailEnd type="triangle" w="med" len="med"/>
+          </a:ln>
+        </p:spPr>
+        <p:style>
+          <a:lnRef idx="1">
+            <a:schemeClr val="accent1"/>
+          </a:lnRef>
+          <a:fillRef idx="0">
+            <a:schemeClr val="accent1"/>
+          </a:fillRef>
+          <a:effectRef idx="0">
+            <a:schemeClr val="accent1"/>
+          </a:effectRef>
+          <a:fontRef idx="minor">
+            <a:schemeClr val="tx1"/>
+          </a:fontRef>
+        </p:style>
+      </p:cxnSp>
+      <p:cxnSp>
+        <p:nvCxnSpPr>
+          <p:cNvPr id="37" name="直線矢印コネクタ 49"/>
+          <p:cNvCxnSpPr>
+            <a:stCxn id="50" idx="3"/>
+            <a:endCxn id="54" idx="3"/>
+          </p:cNvCxnSpPr>
+          <p:nvPr/>
+        </p:nvCxnSpPr>
+        <p:spPr bwMode="invGray">
+          <a:xfrm>
+            <a:off x="9885778" y="1814683"/>
+            <a:ext cx="73517" cy="2140906"/>
+          </a:xfrm>
+          <a:prstGeom prst="bentConnector3">
+            <a:avLst>
+              <a:gd name="adj1" fmla="val 729128"/>
+            </a:avLst>
+          </a:prstGeom>
+          <a:ln w="28575">
+            <a:solidFill>
+              <a:schemeClr val="tx2">
+                <a:lumMod val="40000"/>
+                <a:lumOff val="60000"/>
+              </a:schemeClr>
+            </a:solidFill>
+            <a:prstDash val="dash"/>
+            <a:headEnd type="none" w="lg" len="lg"/>
+            <a:tailEnd type="triangle" w="lg" len="lg"/>
+          </a:ln>
+        </p:spPr>
+        <p:style>
+          <a:lnRef idx="1">
+            <a:schemeClr val="accent1"/>
+          </a:lnRef>
+          <a:fillRef idx="0">
+            <a:schemeClr val="accent1"/>
+          </a:fillRef>
+          <a:effectRef idx="0">
+            <a:schemeClr val="accent1"/>
+          </a:effectRef>
+          <a:fontRef idx="minor">
+            <a:schemeClr val="tx1"/>
+          </a:fontRef>
+        </p:style>
+      </p:cxnSp>
+      <p:sp>
+        <p:nvSpPr>
+          <p:cNvPr id="66" name="右矢印 65"/>
+          <p:cNvSpPr/>
+          <p:nvPr/>
+        </p:nvSpPr>
+        <p:spPr>
+          <a:xfrm>
+            <a:off x="3757146" y="1189955"/>
+            <a:ext cx="1525248" cy="391011"/>
+          </a:xfrm>
+          <a:prstGeom prst="rightArrow">
+            <a:avLst/>
+          </a:prstGeom>
+          <a:solidFill>
+            <a:schemeClr val="tx1">
+              <a:lumMod val="50000"/>
+              <a:lumOff val="50000"/>
+            </a:schemeClr>
+          </a:solidFill>
+          <a:ln>
+            <a:solidFill>
+              <a:schemeClr val="tx1">
+                <a:lumMod val="50000"/>
+                <a:lumOff val="50000"/>
+              </a:schemeClr>
+            </a:solidFill>
+          </a:ln>
+        </p:spPr>
+        <p:style>
+          <a:lnRef idx="2">
+            <a:schemeClr val="accent1">
+              <a:shade val="50000"/>
+            </a:schemeClr>
+          </a:lnRef>
+          <a:fillRef idx="1">
+            <a:schemeClr val="accent1"/>
+          </a:fillRef>
+          <a:effectRef idx="0">
+            <a:schemeClr val="accent1"/>
+          </a:effectRef>
+          <a:fontRef idx="minor">
+            <a:schemeClr val="lt1"/>
+          </a:fontRef>
+        </p:style>
+        <p:txBody>
+          <a:bodyPr rtlCol="0" anchor="ctr"/>
+          <a:lstStyle/>
+          <a:p>
+            <a:pPr algn="ctr"/>
+            <a:endParaRPr kumimoji="1" lang="ja-JP" altLang="en-US"/>
+          </a:p>
+        </p:txBody>
+      </p:sp>
+      <p:sp>
+        <p:nvSpPr>
+          <p:cNvPr id="68" name="右矢印 67"/>
+          <p:cNvSpPr/>
+          <p:nvPr/>
+        </p:nvSpPr>
+        <p:spPr>
+          <a:xfrm>
+            <a:off x="3755858" y="5557960"/>
+            <a:ext cx="1506474" cy="391011"/>
+          </a:xfrm>
+          <a:prstGeom prst="rightArrow">
+            <a:avLst/>
+          </a:prstGeom>
+          <a:solidFill>
+            <a:schemeClr val="tx1">
+              <a:lumMod val="50000"/>
+              <a:lumOff val="50000"/>
+            </a:schemeClr>
+          </a:solidFill>
+          <a:ln>
+            <a:solidFill>
+              <a:schemeClr val="tx1">
+                <a:lumMod val="50000"/>
+                <a:lumOff val="50000"/>
+              </a:schemeClr>
+            </a:solidFill>
+          </a:ln>
+        </p:spPr>
+        <p:style>
+          <a:lnRef idx="2">
+            <a:schemeClr val="accent1">
+              <a:shade val="50000"/>
+            </a:schemeClr>
+          </a:lnRef>
+          <a:fillRef idx="1">
+            <a:schemeClr val="accent1"/>
+          </a:fillRef>
+          <a:effectRef idx="0">
+            <a:schemeClr val="accent1"/>
+          </a:effectRef>
+          <a:fontRef idx="minor">
+            <a:schemeClr val="lt1"/>
+          </a:fontRef>
+        </p:style>
+        <p:txBody>
+          <a:bodyPr rtlCol="0" anchor="ctr"/>
+          <a:lstStyle/>
+          <a:p>
+            <a:pPr algn="ctr"/>
+            <a:endParaRPr kumimoji="1" lang="ja-JP" altLang="en-US"/>
+          </a:p>
+        </p:txBody>
+      </p:sp>
+      <p:sp>
+        <p:nvSpPr>
+          <p:cNvPr id="85" name="テキスト ボックス 84"/>
+          <p:cNvSpPr txBox="1"/>
+          <p:nvPr/>
+        </p:nvSpPr>
+        <p:spPr>
+          <a:xfrm>
+            <a:off x="3775289" y="851356"/>
+            <a:ext cx="1906291" cy="338554"/>
+          </a:xfrm>
+          <a:prstGeom prst="rect">
+            <a:avLst/>
+          </a:prstGeom>
+          <a:noFill/>
+        </p:spPr>
+        <p:txBody>
+          <a:bodyPr wrap="none" rtlCol="0">
+            <a:spAutoFit/>
+          </a:bodyPr>
+          <a:lstStyle/>
+          <a:p>
+            <a:r>
+              <a:rPr kumimoji="1" lang="en-US" altLang="ja-JP" sz="1600" dirty="0" smtClean="0"/>
+              <a:t>/streaming</a:t>
+            </a:r>
+            <a:r>
+              <a:rPr lang="en-US" altLang="ja-JP" sz="1600" dirty="0" smtClean="0"/>
+              <a:t>(1</a:t>
+            </a:r>
+            <a:r>
+              <a:rPr lang="ja-JP" altLang="en-US" sz="1600" dirty="0" smtClean="0"/>
+              <a:t>回目</a:t>
+            </a:r>
+            <a:r>
+              <a:rPr lang="en-US" altLang="ja-JP" sz="1600" dirty="0" smtClean="0"/>
+              <a:t>)</a:t>
+            </a:r>
+            <a:endParaRPr kumimoji="1" lang="ja-JP" altLang="en-US" sz="1600" dirty="0"/>
+          </a:p>
+        </p:txBody>
+      </p:sp>
+      <p:sp>
+        <p:nvSpPr>
+          <p:cNvPr id="87" name="テキスト ボックス 86"/>
+          <p:cNvSpPr txBox="1"/>
+          <p:nvPr/>
+        </p:nvSpPr>
+        <p:spPr>
+          <a:xfrm>
+            <a:off x="6617546" y="1185161"/>
+            <a:ext cx="1125629" cy="338554"/>
+          </a:xfrm>
+          <a:prstGeom prst="rect">
+            <a:avLst/>
+          </a:prstGeom>
+          <a:noFill/>
+        </p:spPr>
+        <p:txBody>
+          <a:bodyPr wrap="none" rtlCol="0">
+            <a:spAutoFit/>
+          </a:bodyPr>
+          <a:lstStyle/>
+          <a:p>
+            <a:r>
+              <a:rPr lang="en-US" altLang="ja-JP" sz="1600" dirty="0" smtClean="0"/>
+              <a:t>streaming</a:t>
+            </a:r>
+            <a:endParaRPr kumimoji="1" lang="ja-JP" altLang="en-US" sz="1600" dirty="0"/>
+          </a:p>
+        </p:txBody>
+      </p:sp>
+      <p:sp>
+        <p:nvSpPr>
+          <p:cNvPr id="88" name="テキスト ボックス 87"/>
+          <p:cNvSpPr txBox="1"/>
+          <p:nvPr/>
+        </p:nvSpPr>
+        <p:spPr>
+          <a:xfrm>
+            <a:off x="3793632" y="5118277"/>
+            <a:ext cx="1225015" cy="584775"/>
+          </a:xfrm>
+          <a:prstGeom prst="rect">
+            <a:avLst/>
+          </a:prstGeom>
+          <a:noFill/>
+        </p:spPr>
+        <p:txBody>
+          <a:bodyPr wrap="none" rtlCol="0">
+            <a:spAutoFit/>
+          </a:bodyPr>
+          <a:lstStyle/>
+          <a:p>
+            <a:pPr algn="ctr"/>
+            <a:r>
+              <a:rPr lang="en-US" altLang="ja-JP" sz="1600"/>
+              <a:t>/streaming</a:t>
+            </a:r>
+            <a:endParaRPr kumimoji="1" lang="en-US" altLang="ja-JP" sz="1600" dirty="0" smtClean="0"/>
+          </a:p>
+          <a:p>
+            <a:pPr algn="ctr"/>
+            <a:r>
+              <a:rPr lang="en-US" altLang="ja-JP" sz="1600" dirty="0" smtClean="0"/>
+              <a:t>(2</a:t>
+            </a:r>
+            <a:r>
+              <a:rPr lang="ja-JP" altLang="en-US" sz="1600" dirty="0" smtClean="0"/>
+              <a:t>回目</a:t>
+            </a:r>
+            <a:r>
+              <a:rPr lang="en-US" altLang="ja-JP" sz="1600" dirty="0" smtClean="0"/>
+              <a:t>)</a:t>
+            </a:r>
+            <a:endParaRPr kumimoji="1" lang="ja-JP" altLang="en-US" sz="1600" dirty="0"/>
+          </a:p>
+        </p:txBody>
+      </p:sp>
+      <p:cxnSp>
+        <p:nvCxnSpPr>
+          <p:cNvPr id="90" name="直線矢印コネクタ 89"/>
+          <p:cNvCxnSpPr/>
+          <p:nvPr/>
+        </p:nvCxnSpPr>
+        <p:spPr bwMode="invGray">
+          <a:xfrm>
+            <a:off x="6307127" y="1545898"/>
+            <a:ext cx="1705397" cy="0"/>
+          </a:xfrm>
+          <a:prstGeom prst="straightConnector1">
+            <a:avLst/>
+          </a:prstGeom>
+          <a:ln w="50800">
+            <a:solidFill>
+              <a:schemeClr val="tx1">
+                <a:lumMod val="50000"/>
+                <a:lumOff val="50000"/>
+              </a:schemeClr>
+            </a:solidFill>
+            <a:headEnd type="none" w="med" len="med"/>
+            <a:tailEnd type="triangle" w="med" len="med"/>
+          </a:ln>
+        </p:spPr>
+        <p:style>
+          <a:lnRef idx="1">
+            <a:schemeClr val="accent1"/>
+          </a:lnRef>
+          <a:fillRef idx="0">
+            <a:schemeClr val="accent1"/>
+          </a:fillRef>
+          <a:effectRef idx="0">
+            <a:schemeClr val="accent1"/>
+          </a:effectRef>
+          <a:fontRef idx="minor">
+            <a:schemeClr val="tx1"/>
+          </a:fontRef>
+        </p:style>
+      </p:cxnSp>
+      <p:sp>
+        <p:nvSpPr>
+          <p:cNvPr id="118" name="テキスト ボックス 117"/>
+          <p:cNvSpPr txBox="1"/>
+          <p:nvPr/>
+        </p:nvSpPr>
+        <p:spPr>
+          <a:xfrm>
+            <a:off x="6514100" y="2057121"/>
+            <a:ext cx="1350050" cy="584775"/>
+          </a:xfrm>
+          <a:prstGeom prst="rect">
+            <a:avLst/>
+          </a:prstGeom>
+          <a:noFill/>
+        </p:spPr>
+        <p:txBody>
+          <a:bodyPr wrap="none" rtlCol="0">
+            <a:spAutoFit/>
+          </a:bodyPr>
+          <a:lstStyle/>
+          <a:p>
+            <a:pPr algn="ctr"/>
+            <a:r>
+              <a:rPr kumimoji="1" lang="en-US" altLang="ja-JP" sz="1600" dirty="0" smtClean="0"/>
+              <a:t>Response</a:t>
+            </a:r>
+          </a:p>
+          <a:p>
+            <a:pPr algn="ctr"/>
+            <a:r>
+              <a:rPr kumimoji="1" lang="en-US" altLang="ja-JP" sz="1600" dirty="0" err="1" smtClean="0"/>
+              <a:t>BodyEmitter</a:t>
+            </a:r>
+            <a:endParaRPr kumimoji="1" lang="ja-JP" altLang="en-US" sz="1600" dirty="0"/>
+          </a:p>
+        </p:txBody>
+      </p:sp>
+      <p:cxnSp>
+        <p:nvCxnSpPr>
+          <p:cNvPr id="67" name="直線矢印コネクタ 66"/>
+          <p:cNvCxnSpPr/>
+          <p:nvPr/>
+        </p:nvCxnSpPr>
+        <p:spPr bwMode="invGray">
+          <a:xfrm flipH="1">
+            <a:off x="2343093" y="3554087"/>
+            <a:ext cx="5859859" cy="42582"/>
+          </a:xfrm>
+          <a:prstGeom prst="straightConnector1">
+            <a:avLst/>
+          </a:prstGeom>
+          <a:ln w="50800">
+            <a:solidFill>
+              <a:schemeClr val="tx1">
+                <a:lumMod val="50000"/>
+                <a:lumOff val="50000"/>
+              </a:schemeClr>
+            </a:solidFill>
+            <a:headEnd type="none" w="med" len="med"/>
+            <a:tailEnd type="triangle" w="med" len="med"/>
+          </a:ln>
+        </p:spPr>
+        <p:style>
+          <a:lnRef idx="1">
+            <a:schemeClr val="accent1"/>
+          </a:lnRef>
+          <a:fillRef idx="0">
+            <a:schemeClr val="accent1"/>
+          </a:fillRef>
+          <a:effectRef idx="0">
+            <a:schemeClr val="accent1"/>
+          </a:effectRef>
+          <a:fontRef idx="minor">
+            <a:schemeClr val="tx1"/>
+          </a:fontRef>
+        </p:style>
+      </p:cxnSp>
+      <p:sp>
+        <p:nvSpPr>
+          <p:cNvPr id="75" name="角丸四角形吹き出し 74"/>
+          <p:cNvSpPr/>
+          <p:nvPr/>
+        </p:nvSpPr>
+        <p:spPr>
+          <a:xfrm>
+            <a:off x="7979313" y="2454717"/>
+            <a:ext cx="1738420" cy="728813"/>
+          </a:xfrm>
+          <a:prstGeom prst="wedgeRoundRectCallout">
+            <a:avLst>
+              <a:gd name="adj1" fmla="val -67243"/>
+              <a:gd name="adj2" fmla="val 61210"/>
+              <a:gd name="adj3" fmla="val 16667"/>
+            </a:avLst>
+          </a:prstGeom>
+          <a:solidFill>
+            <a:schemeClr val="bg1"/>
+          </a:solidFill>
+        </p:spPr>
+        <p:style>
+          <a:lnRef idx="2">
+            <a:schemeClr val="accent1">
+              <a:shade val="50000"/>
+            </a:schemeClr>
+          </a:lnRef>
+          <a:fillRef idx="1">
+            <a:schemeClr val="accent1"/>
+          </a:fillRef>
+          <a:effectRef idx="0">
+            <a:schemeClr val="accent1"/>
+          </a:effectRef>
+          <a:fontRef idx="minor">
+            <a:schemeClr val="lt1"/>
+          </a:fontRef>
+        </p:style>
+        <p:txBody>
+          <a:bodyPr rtlCol="0" anchor="ctr"/>
+          <a:lstStyle/>
+          <a:p>
+            <a:pPr algn="ctr"/>
+            <a:r>
+              <a:rPr kumimoji="1" lang="ja-JP" altLang="en-US" dirty="0" smtClean="0">
+                <a:solidFill>
+                  <a:schemeClr val="tx1"/>
+                </a:solidFill>
+              </a:rPr>
+              <a:t>データ</a:t>
+            </a:r>
+            <a:r>
+              <a:rPr kumimoji="1" lang="ja-JP" altLang="en-US" smtClean="0">
+                <a:solidFill>
+                  <a:schemeClr val="tx1"/>
+                </a:solidFill>
+              </a:rPr>
+              <a:t>を</a:t>
+            </a:r>
+            <a:r>
+              <a:rPr lang="ja-JP" altLang="en-US" smtClean="0">
+                <a:solidFill>
+                  <a:schemeClr val="tx1"/>
+                </a:solidFill>
+              </a:rPr>
+              <a:t>送信</a:t>
+            </a:r>
+            <a:r>
+              <a:rPr lang="en-US" altLang="ja-JP" dirty="0" smtClean="0">
+                <a:solidFill>
+                  <a:schemeClr val="tx1"/>
+                </a:solidFill>
+              </a:rPr>
+              <a:t>(Push)</a:t>
+            </a:r>
+            <a:endParaRPr kumimoji="1" lang="ja-JP" altLang="en-US" dirty="0">
+              <a:solidFill>
+                <a:schemeClr val="tx1"/>
+              </a:solidFill>
+            </a:endParaRPr>
+          </a:p>
+        </p:txBody>
+      </p:sp>
+      <p:sp>
+        <p:nvSpPr>
+          <p:cNvPr id="76" name="テキスト ボックス 75"/>
+          <p:cNvSpPr txBox="1"/>
+          <p:nvPr/>
+        </p:nvSpPr>
+        <p:spPr>
+          <a:xfrm>
+            <a:off x="9885778" y="1400922"/>
+            <a:ext cx="1415773" cy="338554"/>
+          </a:xfrm>
+          <a:prstGeom prst="rect">
+            <a:avLst/>
+          </a:prstGeom>
+          <a:noFill/>
+        </p:spPr>
+        <p:txBody>
+          <a:bodyPr wrap="none" rtlCol="0">
+            <a:spAutoFit/>
+          </a:bodyPr>
+          <a:lstStyle/>
+          <a:p>
+            <a:pPr algn="ctr"/>
+            <a:r>
+              <a:rPr kumimoji="1" lang="ja-JP" altLang="en-US" sz="1600" smtClean="0"/>
+              <a:t>スレッド起動</a:t>
+            </a:r>
+            <a:endParaRPr kumimoji="1" lang="ja-JP" altLang="en-US" sz="1600" dirty="0"/>
+          </a:p>
+        </p:txBody>
+      </p:sp>
+      <p:sp>
+        <p:nvSpPr>
+          <p:cNvPr id="29" name="テキスト ボックス 28"/>
+          <p:cNvSpPr txBox="1"/>
+          <p:nvPr/>
+        </p:nvSpPr>
+        <p:spPr>
+          <a:xfrm>
+            <a:off x="6449980" y="5491224"/>
+            <a:ext cx="3867010" cy="369332"/>
+          </a:xfrm>
+          <a:prstGeom prst="rect">
+            <a:avLst/>
+          </a:prstGeom>
+          <a:noFill/>
+        </p:spPr>
+        <p:txBody>
+          <a:bodyPr wrap="square" rtlCol="0">
+            <a:spAutoFit/>
+          </a:bodyPr>
+          <a:lstStyle/>
+          <a:p>
+            <a:pPr algn="ctr"/>
+            <a:r>
+              <a:rPr kumimoji="1" lang="ja-JP" altLang="en-US" dirty="0" smtClean="0"/>
+              <a:t>・・・</a:t>
+            </a:r>
+            <a:r>
+              <a:rPr kumimoji="1" lang="ja-JP" altLang="en-US" dirty="0" smtClean="0"/>
+              <a:t>・</a:t>
+            </a:r>
+            <a:r>
+              <a:rPr lang="en-US" altLang="ja-JP" dirty="0" smtClean="0"/>
+              <a:t>(</a:t>
+            </a:r>
+            <a:r>
+              <a:rPr kumimoji="1" lang="ja-JP" altLang="en-US" dirty="0" smtClean="0"/>
+              <a:t>省略</a:t>
+            </a:r>
+            <a:r>
+              <a:rPr kumimoji="1" lang="en-US" altLang="ja-JP" dirty="0" smtClean="0"/>
+              <a:t>)</a:t>
+            </a:r>
+            <a:endParaRPr kumimoji="1" lang="ja-JP" altLang="en-US" dirty="0"/>
+          </a:p>
+        </p:txBody>
+      </p:sp>
+      <p:cxnSp>
+        <p:nvCxnSpPr>
+          <p:cNvPr id="86" name="直線矢印コネクタ 85"/>
+          <p:cNvCxnSpPr/>
+          <p:nvPr/>
+        </p:nvCxnSpPr>
+        <p:spPr bwMode="invGray">
+          <a:xfrm flipH="1">
+            <a:off x="3739498" y="2786973"/>
+            <a:ext cx="1533340" cy="0"/>
+          </a:xfrm>
+          <a:prstGeom prst="straightConnector1">
+            <a:avLst/>
+          </a:prstGeom>
+          <a:ln w="50800">
+            <a:solidFill>
+              <a:schemeClr val="tx1">
+                <a:lumMod val="50000"/>
+                <a:lumOff val="50000"/>
+              </a:schemeClr>
+            </a:solidFill>
+            <a:headEnd type="none" w="med" len="med"/>
+            <a:tailEnd type="triangle" w="med" len="med"/>
+          </a:ln>
+        </p:spPr>
+        <p:style>
+          <a:lnRef idx="1">
+            <a:schemeClr val="accent1"/>
+          </a:lnRef>
+          <a:fillRef idx="0">
+            <a:schemeClr val="accent1"/>
+          </a:fillRef>
+          <a:effectRef idx="0">
+            <a:schemeClr val="accent1"/>
+          </a:effectRef>
+          <a:fontRef idx="minor">
+            <a:schemeClr val="tx1"/>
+          </a:fontRef>
+        </p:style>
+      </p:cxnSp>
+      <p:sp>
+        <p:nvSpPr>
+          <p:cNvPr id="91" name="テキスト ボックス 90"/>
+          <p:cNvSpPr txBox="1"/>
+          <p:nvPr/>
+        </p:nvSpPr>
+        <p:spPr>
+          <a:xfrm>
+            <a:off x="3960087" y="2447052"/>
+            <a:ext cx="1184940" cy="338554"/>
+          </a:xfrm>
+          <a:prstGeom prst="rect">
+            <a:avLst/>
+          </a:prstGeom>
+          <a:noFill/>
+        </p:spPr>
+        <p:txBody>
+          <a:bodyPr wrap="none" rtlCol="0">
+            <a:spAutoFit/>
+          </a:bodyPr>
+          <a:lstStyle/>
+          <a:p>
+            <a:pPr algn="ctr"/>
+            <a:r>
+              <a:rPr kumimoji="1" lang="en-US" altLang="ja-JP" sz="1600" dirty="0" err="1" smtClean="0"/>
+              <a:t>startAsync</a:t>
+            </a:r>
+            <a:endParaRPr kumimoji="1" lang="ja-JP" altLang="en-US" sz="1600" dirty="0"/>
+          </a:p>
+        </p:txBody>
+      </p:sp>
+      <p:sp>
+        <p:nvSpPr>
+          <p:cNvPr id="93" name="テキスト ボックス 92"/>
+          <p:cNvSpPr txBox="1"/>
+          <p:nvPr/>
+        </p:nvSpPr>
+        <p:spPr>
+          <a:xfrm>
+            <a:off x="4070866" y="4070217"/>
+            <a:ext cx="1148071" cy="338554"/>
+          </a:xfrm>
+          <a:prstGeom prst="rect">
+            <a:avLst/>
+          </a:prstGeom>
+          <a:noFill/>
+        </p:spPr>
+        <p:txBody>
+          <a:bodyPr wrap="none" rtlCol="0">
+            <a:spAutoFit/>
+          </a:bodyPr>
+          <a:lstStyle/>
+          <a:p>
+            <a:pPr algn="ctr"/>
+            <a:r>
+              <a:rPr kumimoji="1" lang="en-US" altLang="ja-JP" sz="1600" smtClean="0"/>
+              <a:t>dispatch</a:t>
+            </a:r>
+            <a:r>
+              <a:rPr kumimoji="1" lang="en-US" altLang="ja-JP" sz="1600" dirty="0" smtClean="0"/>
+              <a:t>()</a:t>
+            </a:r>
+            <a:endParaRPr kumimoji="1" lang="ja-JP" altLang="en-US" sz="1600" dirty="0"/>
+          </a:p>
+        </p:txBody>
+      </p:sp>
+      <p:cxnSp>
+        <p:nvCxnSpPr>
+          <p:cNvPr id="36" name="直線矢印コネクタ 35"/>
+          <p:cNvCxnSpPr/>
+          <p:nvPr/>
+        </p:nvCxnSpPr>
+        <p:spPr bwMode="invGray">
+          <a:xfrm flipH="1">
+            <a:off x="3551278" y="2227867"/>
+            <a:ext cx="1716828" cy="0"/>
+          </a:xfrm>
+          <a:prstGeom prst="straightConnector1">
+            <a:avLst/>
+          </a:prstGeom>
+          <a:ln w="50800">
+            <a:solidFill>
+              <a:schemeClr val="tx1">
+                <a:lumMod val="50000"/>
+                <a:lumOff val="50000"/>
+              </a:schemeClr>
+            </a:solidFill>
+            <a:headEnd type="none" w="med" len="med"/>
+            <a:tailEnd type="none" w="med" len="med"/>
+          </a:ln>
+        </p:spPr>
+        <p:style>
+          <a:lnRef idx="1">
+            <a:schemeClr val="accent1"/>
+          </a:lnRef>
+          <a:fillRef idx="0">
+            <a:schemeClr val="accent1"/>
+          </a:fillRef>
+          <a:effectRef idx="0">
+            <a:schemeClr val="accent1"/>
+          </a:effectRef>
+          <a:fontRef idx="minor">
+            <a:schemeClr val="tx1"/>
+          </a:fontRef>
+        </p:style>
+      </p:cxnSp>
+      <p:sp>
+        <p:nvSpPr>
+          <p:cNvPr id="41" name="テキスト ボックス 40"/>
+          <p:cNvSpPr txBox="1"/>
+          <p:nvPr/>
+        </p:nvSpPr>
+        <p:spPr>
+          <a:xfrm>
+            <a:off x="4105710" y="1845066"/>
+            <a:ext cx="651140" cy="338554"/>
+          </a:xfrm>
+          <a:prstGeom prst="rect">
+            <a:avLst/>
+          </a:prstGeom>
+          <a:noFill/>
+        </p:spPr>
+        <p:txBody>
+          <a:bodyPr wrap="none" rtlCol="0">
+            <a:spAutoFit/>
+          </a:bodyPr>
+          <a:lstStyle/>
+          <a:p>
+            <a:pPr algn="ctr"/>
+            <a:r>
+              <a:rPr kumimoji="1" lang="en-US" altLang="ja-JP" sz="1600" dirty="0" smtClean="0"/>
+              <a:t>flush</a:t>
+            </a:r>
+            <a:endParaRPr kumimoji="1" lang="ja-JP" altLang="en-US" sz="1600" dirty="0"/>
+          </a:p>
+        </p:txBody>
+      </p:sp>
+      <p:cxnSp>
+        <p:nvCxnSpPr>
+          <p:cNvPr id="42" name="直線矢印コネクタ 41"/>
+          <p:cNvCxnSpPr/>
+          <p:nvPr/>
+        </p:nvCxnSpPr>
+        <p:spPr bwMode="invGray">
+          <a:xfrm rot="10800000" flipV="1">
+            <a:off x="1873497" y="2239119"/>
+            <a:ext cx="939193" cy="604219"/>
+          </a:xfrm>
+          <a:prstGeom prst="bentConnector3">
+            <a:avLst>
+              <a:gd name="adj1" fmla="val 100201"/>
+            </a:avLst>
+          </a:prstGeom>
+          <a:ln w="50800">
+            <a:solidFill>
+              <a:schemeClr val="tx1">
+                <a:lumMod val="50000"/>
+                <a:lumOff val="50000"/>
+              </a:schemeClr>
+            </a:solidFill>
+            <a:headEnd type="none" w="med" len="med"/>
+            <a:tailEnd type="triangle" w="med" len="med"/>
+          </a:ln>
+        </p:spPr>
+        <p:style>
+          <a:lnRef idx="1">
+            <a:schemeClr val="accent1"/>
+          </a:lnRef>
+          <a:fillRef idx="0">
+            <a:schemeClr val="accent1"/>
+          </a:fillRef>
+          <a:effectRef idx="0">
+            <a:schemeClr val="accent1"/>
+          </a:effectRef>
+          <a:fontRef idx="minor">
+            <a:schemeClr val="tx1"/>
+          </a:fontRef>
+        </p:style>
+      </p:cxnSp>
+      <p:sp>
+        <p:nvSpPr>
+          <p:cNvPr id="63" name="テキスト ボックス 62"/>
+          <p:cNvSpPr txBox="1"/>
+          <p:nvPr/>
+        </p:nvSpPr>
+        <p:spPr>
+          <a:xfrm>
+            <a:off x="7330530" y="3228234"/>
+            <a:ext cx="639920" cy="338554"/>
+          </a:xfrm>
+          <a:prstGeom prst="rect">
+            <a:avLst/>
+          </a:prstGeom>
+          <a:noFill/>
+        </p:spPr>
+        <p:txBody>
+          <a:bodyPr wrap="none" rtlCol="0">
+            <a:spAutoFit/>
+          </a:bodyPr>
+          <a:lstStyle/>
+          <a:p>
+            <a:pPr algn="ctr"/>
+            <a:r>
+              <a:rPr kumimoji="1" lang="en-US" altLang="ja-JP" sz="1600" dirty="0" smtClean="0"/>
+              <a:t>send</a:t>
+            </a:r>
+            <a:endParaRPr kumimoji="1" lang="ja-JP" altLang="en-US" sz="1600" dirty="0"/>
+          </a:p>
+        </p:txBody>
+      </p:sp>
+      <p:sp>
+        <p:nvSpPr>
+          <p:cNvPr id="65" name="テキスト ボックス 64"/>
+          <p:cNvSpPr txBox="1"/>
+          <p:nvPr/>
+        </p:nvSpPr>
+        <p:spPr>
+          <a:xfrm>
+            <a:off x="3846732" y="3251446"/>
+            <a:ext cx="1391728" cy="338554"/>
+          </a:xfrm>
+          <a:prstGeom prst="rect">
+            <a:avLst/>
+          </a:prstGeom>
+          <a:noFill/>
+        </p:spPr>
+        <p:txBody>
+          <a:bodyPr wrap="none" rtlCol="0">
+            <a:spAutoFit/>
+          </a:bodyPr>
+          <a:lstStyle/>
+          <a:p>
+            <a:pPr algn="ctr"/>
+            <a:r>
+              <a:rPr lang="en-US" altLang="ja-JP" sz="1600" dirty="0" smtClean="0"/>
+              <a:t>w</a:t>
+            </a:r>
+            <a:r>
+              <a:rPr kumimoji="1" lang="en-US" altLang="ja-JP" sz="1600" dirty="0" smtClean="0"/>
+              <a:t>rite &amp; flush</a:t>
+            </a:r>
+            <a:endParaRPr kumimoji="1" lang="ja-JP" altLang="en-US" sz="1600" dirty="0"/>
+          </a:p>
+        </p:txBody>
+      </p:sp>
+      <p:cxnSp>
+        <p:nvCxnSpPr>
+          <p:cNvPr id="69" name="直線矢印コネクタ 68"/>
+          <p:cNvCxnSpPr/>
+          <p:nvPr/>
+        </p:nvCxnSpPr>
+        <p:spPr bwMode="invGray">
+          <a:xfrm flipH="1">
+            <a:off x="2343093" y="3962159"/>
+            <a:ext cx="5859859" cy="49365"/>
+          </a:xfrm>
+          <a:prstGeom prst="straightConnector1">
+            <a:avLst/>
+          </a:prstGeom>
+          <a:ln w="50800">
+            <a:solidFill>
+              <a:schemeClr val="tx1">
+                <a:lumMod val="50000"/>
+                <a:lumOff val="50000"/>
+              </a:schemeClr>
+            </a:solidFill>
+            <a:headEnd type="none" w="med" len="med"/>
+            <a:tailEnd type="triangle" w="med" len="med"/>
+          </a:ln>
+        </p:spPr>
+        <p:style>
+          <a:lnRef idx="1">
+            <a:schemeClr val="accent1"/>
+          </a:lnRef>
+          <a:fillRef idx="0">
+            <a:schemeClr val="accent1"/>
+          </a:fillRef>
+          <a:effectRef idx="0">
+            <a:schemeClr val="accent1"/>
+          </a:effectRef>
+          <a:fontRef idx="minor">
+            <a:schemeClr val="tx1"/>
+          </a:fontRef>
+        </p:style>
+      </p:cxnSp>
+      <p:sp>
+        <p:nvSpPr>
+          <p:cNvPr id="77" name="テキスト ボックス 76"/>
+          <p:cNvSpPr txBox="1"/>
+          <p:nvPr/>
+        </p:nvSpPr>
+        <p:spPr>
+          <a:xfrm>
+            <a:off x="7341267" y="3657522"/>
+            <a:ext cx="639920" cy="338554"/>
+          </a:xfrm>
+          <a:prstGeom prst="rect">
+            <a:avLst/>
+          </a:prstGeom>
+          <a:noFill/>
+        </p:spPr>
+        <p:txBody>
+          <a:bodyPr wrap="none" rtlCol="0">
+            <a:spAutoFit/>
+          </a:bodyPr>
+          <a:lstStyle/>
+          <a:p>
+            <a:pPr algn="ctr"/>
+            <a:r>
+              <a:rPr kumimoji="1" lang="en-US" altLang="ja-JP" sz="1600" dirty="0" smtClean="0"/>
+              <a:t>send</a:t>
+            </a:r>
+            <a:endParaRPr kumimoji="1" lang="ja-JP" altLang="en-US" sz="1600" dirty="0"/>
+          </a:p>
+        </p:txBody>
+      </p:sp>
+      <p:sp>
+        <p:nvSpPr>
+          <p:cNvPr id="79" name="テキスト ボックス 78"/>
+          <p:cNvSpPr txBox="1"/>
+          <p:nvPr/>
+        </p:nvSpPr>
+        <p:spPr>
+          <a:xfrm>
+            <a:off x="3865962" y="3650775"/>
+            <a:ext cx="1391728" cy="338554"/>
+          </a:xfrm>
+          <a:prstGeom prst="rect">
+            <a:avLst/>
+          </a:prstGeom>
+          <a:noFill/>
+        </p:spPr>
+        <p:txBody>
+          <a:bodyPr wrap="none" rtlCol="0">
+            <a:spAutoFit/>
+          </a:bodyPr>
+          <a:lstStyle/>
+          <a:p>
+            <a:pPr algn="ctr"/>
+            <a:r>
+              <a:rPr lang="en-US" altLang="ja-JP" sz="1600" dirty="0"/>
+              <a:t>write &amp; flush</a:t>
+            </a:r>
+            <a:endParaRPr lang="ja-JP" altLang="en-US" sz="1600" dirty="0"/>
+          </a:p>
+        </p:txBody>
+      </p:sp>
+      <p:cxnSp>
+        <p:nvCxnSpPr>
+          <p:cNvPr id="82" name="直線矢印コネクタ 81"/>
+          <p:cNvCxnSpPr/>
+          <p:nvPr/>
+        </p:nvCxnSpPr>
+        <p:spPr bwMode="invGray">
+          <a:xfrm flipH="1" flipV="1">
+            <a:off x="3711789" y="4408474"/>
+            <a:ext cx="4491163" cy="297"/>
+          </a:xfrm>
+          <a:prstGeom prst="straightConnector1">
+            <a:avLst/>
+          </a:prstGeom>
+          <a:ln w="50800">
+            <a:solidFill>
+              <a:schemeClr val="tx1">
+                <a:lumMod val="50000"/>
+                <a:lumOff val="50000"/>
+              </a:schemeClr>
+            </a:solidFill>
+            <a:headEnd type="none" w="med" len="med"/>
+            <a:tailEnd type="triangle" w="med" len="med"/>
+          </a:ln>
+        </p:spPr>
+        <p:style>
+          <a:lnRef idx="1">
+            <a:schemeClr val="accent1"/>
+          </a:lnRef>
+          <a:fillRef idx="0">
+            <a:schemeClr val="accent1"/>
+          </a:fillRef>
+          <a:effectRef idx="0">
+            <a:schemeClr val="accent1"/>
+          </a:effectRef>
+          <a:fontRef idx="minor">
+            <a:schemeClr val="tx1"/>
+          </a:fontRef>
+        </p:style>
+      </p:cxnSp>
+      <p:sp>
+        <p:nvSpPr>
+          <p:cNvPr id="83" name="正方形/長方形 82"/>
+          <p:cNvSpPr/>
+          <p:nvPr/>
+        </p:nvSpPr>
+        <p:spPr>
+          <a:xfrm>
+            <a:off x="6525749" y="3213803"/>
+            <a:ext cx="664462" cy="1614100"/>
+          </a:xfrm>
+          <a:prstGeom prst="rect">
+            <a:avLst/>
+          </a:prstGeom>
+          <a:solidFill>
+            <a:srgbClr val="92D050"/>
+          </a:solidFill>
+          <a:ln>
+            <a:solidFill>
+              <a:srgbClr val="92D050"/>
+            </a:solidFill>
+          </a:ln>
+        </p:spPr>
+        <p:style>
+          <a:lnRef idx="1">
+            <a:schemeClr val="accent6"/>
+          </a:lnRef>
+          <a:fillRef idx="2">
+            <a:schemeClr val="accent6"/>
+          </a:fillRef>
+          <a:effectRef idx="1">
+            <a:schemeClr val="accent6"/>
+          </a:effectRef>
+          <a:fontRef idx="minor">
+            <a:schemeClr val="dk1"/>
+          </a:fontRef>
+        </p:style>
+        <p:txBody>
+          <a:bodyPr vert="vert" rtlCol="0" anchor="ctr"/>
+          <a:lstStyle/>
+          <a:p>
+            <a:pPr algn="ctr"/>
+            <a:r>
+              <a:rPr lang="en-US" altLang="ja-JP" dirty="0" smtClean="0"/>
+              <a:t>Response</a:t>
+            </a:r>
+          </a:p>
+          <a:p>
+            <a:pPr algn="ctr"/>
+            <a:r>
+              <a:rPr lang="en-US" altLang="ja-JP" dirty="0" err="1" smtClean="0"/>
+              <a:t>BodyEmitter</a:t>
+            </a:r>
+            <a:endParaRPr kumimoji="1" lang="ja-JP" altLang="en-US" dirty="0"/>
+          </a:p>
+        </p:txBody>
+      </p:sp>
+      <p:sp>
+        <p:nvSpPr>
+          <p:cNvPr id="84" name="正方形/長方形 83"/>
+          <p:cNvSpPr/>
+          <p:nvPr/>
+        </p:nvSpPr>
+        <p:spPr>
+          <a:xfrm>
+            <a:off x="5342374" y="1138703"/>
+            <a:ext cx="904773" cy="4964392"/>
+          </a:xfrm>
+          <a:prstGeom prst="rect">
+            <a:avLst/>
+          </a:prstGeom>
+          <a:solidFill>
+            <a:srgbClr val="92D050"/>
+          </a:solidFill>
+          <a:ln>
+            <a:solidFill>
+              <a:srgbClr val="92D050"/>
+            </a:solidFill>
+          </a:ln>
+        </p:spPr>
+        <p:style>
+          <a:lnRef idx="1">
+            <a:schemeClr val="accent6"/>
+          </a:lnRef>
+          <a:fillRef idx="2">
+            <a:schemeClr val="accent6"/>
+          </a:fillRef>
+          <a:effectRef idx="1">
+            <a:schemeClr val="accent6"/>
+          </a:effectRef>
+          <a:fontRef idx="minor">
+            <a:schemeClr val="dk1"/>
+          </a:fontRef>
+        </p:style>
+        <p:txBody>
+          <a:bodyPr vert="vert" rtlCol="0" anchor="ctr"/>
+          <a:lstStyle/>
+          <a:p>
+            <a:pPr algn="ctr"/>
+            <a:r>
+              <a:rPr lang="en-US" altLang="ja-JP" dirty="0" err="1" smtClean="0"/>
+              <a:t>DispatcherServlet</a:t>
+            </a:r>
+            <a:endParaRPr lang="en-US" altLang="ja-JP" dirty="0" smtClean="0"/>
+          </a:p>
+          <a:p>
+            <a:pPr algn="ctr"/>
+            <a:r>
+              <a:rPr lang="en-US" altLang="ja-JP" dirty="0" smtClean="0"/>
+              <a:t>(</a:t>
+            </a:r>
+            <a:r>
+              <a:rPr lang="en-US" altLang="ja-JP" dirty="0" err="1"/>
+              <a:t>WebAsyncManager</a:t>
+            </a:r>
+            <a:r>
+              <a:rPr lang="en-US" altLang="ja-JP" dirty="0"/>
+              <a:t>)</a:t>
+            </a:r>
+            <a:endParaRPr kumimoji="1" lang="ja-JP" altLang="en-US" dirty="0"/>
+          </a:p>
+        </p:txBody>
+      </p:sp>
+      <p:sp>
+        <p:nvSpPr>
+          <p:cNvPr id="89" name="正方形/長方形 88"/>
+          <p:cNvSpPr/>
+          <p:nvPr/>
+        </p:nvSpPr>
+        <p:spPr>
+          <a:xfrm rot="5400000">
+            <a:off x="474397" y="3152336"/>
+            <a:ext cx="5538414" cy="936368"/>
+          </a:xfrm>
+          <a:prstGeom prst="rect">
+            <a:avLst/>
+          </a:prstGeom>
+          <a:solidFill>
+            <a:srgbClr val="D99897"/>
+          </a:solidFill>
+          <a:ln>
+            <a:noFill/>
+          </a:ln>
+        </p:spPr>
+        <p:style>
+          <a:lnRef idx="2">
+            <a:schemeClr val="accent1">
+              <a:shade val="50000"/>
+            </a:schemeClr>
+          </a:lnRef>
+          <a:fillRef idx="1">
+            <a:schemeClr val="accent1"/>
+          </a:fillRef>
+          <a:effectRef idx="0">
+            <a:schemeClr val="accent1"/>
+          </a:effectRef>
+          <a:fontRef idx="minor">
+            <a:schemeClr val="lt1"/>
+          </a:fontRef>
+        </p:style>
+        <p:txBody>
+          <a:bodyPr rtlCol="0" anchor="ctr"/>
+          <a:lstStyle/>
+          <a:p>
+            <a:pPr algn="ctr"/>
+            <a:r>
+              <a:rPr lang="ja-JP" altLang="en-US" sz="2000" dirty="0">
+                <a:solidFill>
+                  <a:schemeClr val="bg1"/>
+                </a:solidFill>
+                <a:latin typeface="HGP創英角ｺﾞｼｯｸUB" panose="020B0900000000000000" pitchFamily="50" charset="-128"/>
+                <a:ea typeface="HGP創英角ｺﾞｼｯｸUB" panose="020B0900000000000000" pitchFamily="50" charset="-128"/>
+              </a:rPr>
+              <a:t>サーブレットコンテナ</a:t>
+            </a:r>
+            <a:endParaRPr lang="en-US" altLang="ja-JP" sz="2000" dirty="0">
+              <a:solidFill>
+                <a:schemeClr val="bg1"/>
+              </a:solidFill>
+              <a:latin typeface="HGP創英角ｺﾞｼｯｸUB" panose="020B0900000000000000" pitchFamily="50" charset="-128"/>
+              <a:ea typeface="HGP創英角ｺﾞｼｯｸUB" panose="020B0900000000000000" pitchFamily="50" charset="-128"/>
+            </a:endParaRPr>
+          </a:p>
+        </p:txBody>
+      </p:sp>
+      <p:sp>
+        <p:nvSpPr>
+          <p:cNvPr id="92" name="テキスト ボックス 91"/>
+          <p:cNvSpPr txBox="1"/>
+          <p:nvPr/>
+        </p:nvSpPr>
+        <p:spPr>
+          <a:xfrm>
+            <a:off x="7147855" y="4086370"/>
+            <a:ext cx="1055097" cy="338554"/>
+          </a:xfrm>
+          <a:prstGeom prst="rect">
+            <a:avLst/>
+          </a:prstGeom>
+          <a:noFill/>
+        </p:spPr>
+        <p:txBody>
+          <a:bodyPr wrap="none" rtlCol="0">
+            <a:spAutoFit/>
+          </a:bodyPr>
+          <a:lstStyle/>
+          <a:p>
+            <a:pPr algn="ctr"/>
+            <a:r>
+              <a:rPr kumimoji="1" lang="en-US" altLang="ja-JP" sz="1600" dirty="0" smtClean="0"/>
+              <a:t>complete</a:t>
+            </a:r>
+            <a:endParaRPr kumimoji="1" lang="ja-JP" altLang="en-US" sz="1600" dirty="0"/>
+          </a:p>
+        </p:txBody>
+      </p:sp>
+      <p:sp>
+        <p:nvSpPr>
+          <p:cNvPr id="94" name="角丸四角形吹き出し 93"/>
+          <p:cNvSpPr/>
+          <p:nvPr/>
+        </p:nvSpPr>
+        <p:spPr>
+          <a:xfrm>
+            <a:off x="7877732" y="4571426"/>
+            <a:ext cx="1786901" cy="579713"/>
+          </a:xfrm>
+          <a:prstGeom prst="wedgeRoundRectCallout">
+            <a:avLst>
+              <a:gd name="adj1" fmla="val -48833"/>
+              <a:gd name="adj2" fmla="val -85345"/>
+              <a:gd name="adj3" fmla="val 16667"/>
+            </a:avLst>
+          </a:prstGeom>
+          <a:solidFill>
+            <a:schemeClr val="bg1"/>
+          </a:solidFill>
+        </p:spPr>
+        <p:style>
+          <a:lnRef idx="2">
+            <a:schemeClr val="accent1">
+              <a:shade val="50000"/>
+            </a:schemeClr>
+          </a:lnRef>
+          <a:fillRef idx="1">
+            <a:schemeClr val="accent1"/>
+          </a:fillRef>
+          <a:effectRef idx="0">
+            <a:schemeClr val="accent1"/>
+          </a:effectRef>
+          <a:fontRef idx="minor">
+            <a:schemeClr val="lt1"/>
+          </a:fontRef>
+        </p:style>
+        <p:txBody>
+          <a:bodyPr rtlCol="0" anchor="ctr"/>
+          <a:lstStyle/>
+          <a:p>
+            <a:pPr algn="ctr"/>
+            <a:r>
+              <a:rPr lang="ja-JP" altLang="en-US" dirty="0" smtClean="0">
+                <a:solidFill>
+                  <a:schemeClr val="tx1"/>
+                </a:solidFill>
+              </a:rPr>
+              <a:t>データ送信の</a:t>
+            </a:r>
+            <a:endParaRPr lang="en-US" altLang="ja-JP" dirty="0" smtClean="0">
+              <a:solidFill>
+                <a:schemeClr val="tx1"/>
+              </a:solidFill>
+            </a:endParaRPr>
+          </a:p>
+          <a:p>
+            <a:pPr algn="ctr"/>
+            <a:r>
+              <a:rPr lang="ja-JP" altLang="en-US" dirty="0" smtClean="0">
+                <a:solidFill>
+                  <a:schemeClr val="tx1"/>
+                </a:solidFill>
+              </a:rPr>
+              <a:t>完了通知</a:t>
+            </a:r>
+            <a:endParaRPr kumimoji="1" lang="ja-JP" altLang="en-US" dirty="0">
+              <a:solidFill>
+                <a:schemeClr val="tx1"/>
+              </a:solidFill>
+            </a:endParaRPr>
+          </a:p>
+        </p:txBody>
+      </p:sp>
+      <p:sp>
+        <p:nvSpPr>
+          <p:cNvPr id="95" name="テキスト ボックス 94"/>
+          <p:cNvSpPr txBox="1"/>
+          <p:nvPr/>
+        </p:nvSpPr>
+        <p:spPr>
+          <a:xfrm>
+            <a:off x="582135" y="480451"/>
+            <a:ext cx="4333238" cy="338554"/>
+          </a:xfrm>
+          <a:prstGeom prst="rect">
+            <a:avLst/>
+          </a:prstGeom>
+          <a:noFill/>
+        </p:spPr>
+        <p:txBody>
+          <a:bodyPr wrap="none" rtlCol="0">
+            <a:spAutoFit/>
+          </a:bodyPr>
+          <a:lstStyle/>
+          <a:p>
+            <a:r>
+              <a:rPr lang="en-US" altLang="ja-JP" sz="1600" dirty="0"/>
+              <a:t>/</a:t>
+            </a:r>
+            <a:r>
+              <a:rPr lang="en-US" altLang="ja-JP" sz="1600" dirty="0" err="1" smtClean="0"/>
+              <a:t>streaming</a:t>
+            </a:r>
+            <a:r>
+              <a:rPr lang="en-US" altLang="ja-JP" sz="1600" dirty="0" err="1" smtClean="0"/>
+              <a:t>?eventNumber</a:t>
+            </a:r>
+            <a:r>
+              <a:rPr lang="en-US" altLang="ja-JP" sz="1600" dirty="0" smtClean="0"/>
+              <a:t>=2&amp;interval</a:t>
+            </a:r>
+            <a:r>
+              <a:rPr kumimoji="1" lang="en-US" altLang="ja-JP" sz="1600" dirty="0" smtClean="0"/>
+              <a:t>Sec</a:t>
+            </a:r>
+            <a:r>
+              <a:rPr lang="en-US" altLang="ja-JP" sz="1600" dirty="0" smtClean="0"/>
+              <a:t>=1</a:t>
+            </a:r>
+            <a:endParaRPr kumimoji="1" lang="ja-JP" altLang="en-US" sz="1600" dirty="0"/>
+          </a:p>
+        </p:txBody>
+      </p:sp>
+    </p:spTree>
+    <p:extLst>
+      <p:ext uri="{BB962C8B-B14F-4D97-AF65-F5344CB8AC3E}">
+        <p14:creationId xmlns:p14="http://schemas.microsoft.com/office/powerpoint/2010/main" val="357143313"/>
       </p:ext>
     </p:extLst>
   </p:cSld>

</xml_diff>